<commit_message>
Updated presentation font size
</commit_message>
<xml_diff>
--- a/docs/MicroService-manager.pptx
+++ b/docs/MicroService-manager.pptx
@@ -293,6 +293,7 @@
           <a:p>
             <a:fld id="{A09717DC-6258-4BEB-A195-20110ECBA72F}" type="datetimeFigureOut">
               <a:rPr lang="en-US" smtClean="0"/>
+              <a:pPr/>
               <a:t>2/3/2016</a:t>
             </a:fld>
             <a:endParaRPr lang="en-US"/>
@@ -335,6 +336,7 @@
           <a:p>
             <a:fld id="{A49A9634-D921-434C-893F-E2403F38C109}" type="slidenum">
               <a:rPr lang="en-US" smtClean="0"/>
+              <a:pPr/>
               <a:t>‹#›</a:t>
             </a:fld>
             <a:endParaRPr lang="en-US"/>
@@ -458,6 +460,7 @@
           <a:p>
             <a:fld id="{A09717DC-6258-4BEB-A195-20110ECBA72F}" type="datetimeFigureOut">
               <a:rPr lang="en-US" smtClean="0"/>
+              <a:pPr/>
               <a:t>2/3/2016</a:t>
             </a:fld>
             <a:endParaRPr lang="en-US"/>
@@ -500,6 +503,7 @@
           <a:p>
             <a:fld id="{A49A9634-D921-434C-893F-E2403F38C109}" type="slidenum">
               <a:rPr lang="en-US" smtClean="0"/>
+              <a:pPr/>
               <a:t>‹#›</a:t>
             </a:fld>
             <a:endParaRPr lang="en-US"/>
@@ -633,6 +637,7 @@
           <a:p>
             <a:fld id="{A09717DC-6258-4BEB-A195-20110ECBA72F}" type="datetimeFigureOut">
               <a:rPr lang="en-US" smtClean="0"/>
+              <a:pPr/>
               <a:t>2/3/2016</a:t>
             </a:fld>
             <a:endParaRPr lang="en-US"/>
@@ -675,6 +680,7 @@
           <a:p>
             <a:fld id="{A49A9634-D921-434C-893F-E2403F38C109}" type="slidenum">
               <a:rPr lang="en-US" smtClean="0"/>
+              <a:pPr/>
               <a:t>‹#›</a:t>
             </a:fld>
             <a:endParaRPr lang="en-US"/>
@@ -798,6 +804,7 @@
           <a:p>
             <a:fld id="{A09717DC-6258-4BEB-A195-20110ECBA72F}" type="datetimeFigureOut">
               <a:rPr lang="en-US" smtClean="0"/>
+              <a:pPr/>
               <a:t>2/3/2016</a:t>
             </a:fld>
             <a:endParaRPr lang="en-US"/>
@@ -840,6 +847,7 @@
           <a:p>
             <a:fld id="{A49A9634-D921-434C-893F-E2403F38C109}" type="slidenum">
               <a:rPr lang="en-US" smtClean="0"/>
+              <a:pPr/>
               <a:t>‹#›</a:t>
             </a:fld>
             <a:endParaRPr lang="en-US"/>
@@ -1039,6 +1047,7 @@
           <a:p>
             <a:fld id="{A09717DC-6258-4BEB-A195-20110ECBA72F}" type="datetimeFigureOut">
               <a:rPr lang="en-US" smtClean="0"/>
+              <a:pPr/>
               <a:t>2/3/2016</a:t>
             </a:fld>
             <a:endParaRPr lang="en-US"/>
@@ -1081,6 +1090,7 @@
           <a:p>
             <a:fld id="{A49A9634-D921-434C-893F-E2403F38C109}" type="slidenum">
               <a:rPr lang="en-US" smtClean="0"/>
+              <a:pPr/>
               <a:t>‹#›</a:t>
             </a:fld>
             <a:endParaRPr lang="en-US"/>
@@ -1322,6 +1332,7 @@
           <a:p>
             <a:fld id="{A09717DC-6258-4BEB-A195-20110ECBA72F}" type="datetimeFigureOut">
               <a:rPr lang="en-US" smtClean="0"/>
+              <a:pPr/>
               <a:t>2/3/2016</a:t>
             </a:fld>
             <a:endParaRPr lang="en-US"/>
@@ -1364,6 +1375,7 @@
           <a:p>
             <a:fld id="{A49A9634-D921-434C-893F-E2403F38C109}" type="slidenum">
               <a:rPr lang="en-US" smtClean="0"/>
+              <a:pPr/>
               <a:t>‹#›</a:t>
             </a:fld>
             <a:endParaRPr lang="en-US"/>
@@ -1739,6 +1751,7 @@
           <a:p>
             <a:fld id="{A09717DC-6258-4BEB-A195-20110ECBA72F}" type="datetimeFigureOut">
               <a:rPr lang="en-US" smtClean="0"/>
+              <a:pPr/>
               <a:t>2/3/2016</a:t>
             </a:fld>
             <a:endParaRPr lang="en-US"/>
@@ -1781,6 +1794,7 @@
           <a:p>
             <a:fld id="{A49A9634-D921-434C-893F-E2403F38C109}" type="slidenum">
               <a:rPr lang="en-US" smtClean="0"/>
+              <a:pPr/>
               <a:t>‹#›</a:t>
             </a:fld>
             <a:endParaRPr lang="en-US"/>
@@ -1852,6 +1866,7 @@
           <a:p>
             <a:fld id="{A09717DC-6258-4BEB-A195-20110ECBA72F}" type="datetimeFigureOut">
               <a:rPr lang="en-US" smtClean="0"/>
+              <a:pPr/>
               <a:t>2/3/2016</a:t>
             </a:fld>
             <a:endParaRPr lang="en-US"/>
@@ -1894,6 +1909,7 @@
           <a:p>
             <a:fld id="{A49A9634-D921-434C-893F-E2403F38C109}" type="slidenum">
               <a:rPr lang="en-US" smtClean="0"/>
+              <a:pPr/>
               <a:t>‹#›</a:t>
             </a:fld>
             <a:endParaRPr lang="en-US"/>
@@ -1942,6 +1958,7 @@
           <a:p>
             <a:fld id="{A09717DC-6258-4BEB-A195-20110ECBA72F}" type="datetimeFigureOut">
               <a:rPr lang="en-US" smtClean="0"/>
+              <a:pPr/>
               <a:t>2/3/2016</a:t>
             </a:fld>
             <a:endParaRPr lang="en-US"/>
@@ -1984,6 +2001,7 @@
           <a:p>
             <a:fld id="{A49A9634-D921-434C-893F-E2403F38C109}" type="slidenum">
               <a:rPr lang="en-US" smtClean="0"/>
+              <a:pPr/>
               <a:t>‹#›</a:t>
             </a:fld>
             <a:endParaRPr lang="en-US"/>
@@ -2214,6 +2232,7 @@
           <a:p>
             <a:fld id="{A09717DC-6258-4BEB-A195-20110ECBA72F}" type="datetimeFigureOut">
               <a:rPr lang="en-US" smtClean="0"/>
+              <a:pPr/>
               <a:t>2/3/2016</a:t>
             </a:fld>
             <a:endParaRPr lang="en-US"/>
@@ -2256,6 +2275,7 @@
           <a:p>
             <a:fld id="{A49A9634-D921-434C-893F-E2403F38C109}" type="slidenum">
               <a:rPr lang="en-US" smtClean="0"/>
+              <a:pPr/>
               <a:t>‹#›</a:t>
             </a:fld>
             <a:endParaRPr lang="en-US"/>
@@ -2462,6 +2482,7 @@
           <a:p>
             <a:fld id="{A09717DC-6258-4BEB-A195-20110ECBA72F}" type="datetimeFigureOut">
               <a:rPr lang="en-US" smtClean="0"/>
+              <a:pPr/>
               <a:t>2/3/2016</a:t>
             </a:fld>
             <a:endParaRPr lang="en-US"/>
@@ -2504,6 +2525,7 @@
           <a:p>
             <a:fld id="{A49A9634-D921-434C-893F-E2403F38C109}" type="slidenum">
               <a:rPr lang="en-US" smtClean="0"/>
+              <a:pPr/>
               <a:t>‹#›</a:t>
             </a:fld>
             <a:endParaRPr lang="en-US"/>
@@ -2670,6 +2692,7 @@
           <a:p>
             <a:fld id="{A09717DC-6258-4BEB-A195-20110ECBA72F}" type="datetimeFigureOut">
               <a:rPr lang="en-US" smtClean="0"/>
+              <a:pPr/>
               <a:t>2/3/2016</a:t>
             </a:fld>
             <a:endParaRPr lang="en-US"/>
@@ -2748,6 +2771,7 @@
           <a:p>
             <a:fld id="{A49A9634-D921-434C-893F-E2403F38C109}" type="slidenum">
               <a:rPr lang="en-US" smtClean="0"/>
+              <a:pPr/>
               <a:t>‹#›</a:t>
             </a:fld>
             <a:endParaRPr lang="en-US"/>
@@ -3049,7 +3073,7 @@
           <p:nvPr>
             <p:extLst>
               <p:ext uri="{D42A27DB-BD31-4B8C-83A1-F6EECF244321}">
-                <p14:modId xmlns:p14="http://schemas.microsoft.com/office/powerpoint/2010/main" xmlns="" val="3325349280"/>
+                <p14:modId xmlns="" xmlns:p14="http://schemas.microsoft.com/office/powerpoint/2010/main" val="3325349280"/>
               </p:ext>
             </p:extLst>
           </p:nvPr>
@@ -3725,7 +3749,7 @@
               <a:buChar char="q"/>
             </a:pPr>
             <a:r>
-              <a:rPr lang="en-US" sz="2800" dirty="0" smtClean="0">
+              <a:rPr lang="en-US" sz="2400" dirty="0" smtClean="0">
                 <a:solidFill>
                   <a:schemeClr val="tx1"/>
                 </a:solidFill>
@@ -3733,7 +3757,7 @@
               <a:t>Prepare infrastructure - Create a virtual machine having Ubuntu OS with </a:t>
             </a:r>
             <a:r>
-              <a:rPr lang="en-US" sz="2800" i="1" dirty="0" smtClean="0">
+              <a:rPr lang="en-US" sz="2400" i="1" dirty="0" smtClean="0">
                 <a:solidFill>
                   <a:schemeClr val="tx1"/>
                 </a:solidFill>
@@ -3741,12 +3765,20 @@
               <a:t>docker engine</a:t>
             </a:r>
             <a:r>
-              <a:rPr lang="en-US" sz="2800" dirty="0" smtClean="0">
+              <a:rPr lang="en-US" sz="2400" dirty="0" smtClean="0">
                 <a:solidFill>
                   <a:schemeClr val="tx1"/>
                 </a:solidFill>
               </a:rPr>
-              <a:t> installed</a:t>
+              <a:t> </a:t>
+            </a:r>
+            <a:r>
+              <a:rPr lang="en-US" sz="2400" dirty="0" smtClean="0">
+                <a:solidFill>
+                  <a:schemeClr val="tx1"/>
+                </a:solidFill>
+              </a:rPr>
+              <a:t>installed</a:t>
             </a:r>
           </a:p>
           <a:p>
@@ -3754,8 +3786,19 @@
               <a:buFont typeface="Wingdings" pitchFamily="2" charset="2"/>
               <a:buChar char="q"/>
             </a:pPr>
-            <a:r>
-              <a:rPr lang="en-US" sz="2800" dirty="0" smtClean="0">
+            <a:endParaRPr lang="en-US" sz="2400" dirty="0" smtClean="0">
+              <a:solidFill>
+                <a:schemeClr val="tx1"/>
+              </a:solidFill>
+            </a:endParaRPr>
+          </a:p>
+          <a:p>
+            <a:pPr marL="342900" indent="-342900">
+              <a:buFont typeface="Wingdings" pitchFamily="2" charset="2"/>
+              <a:buChar char="q"/>
+            </a:pPr>
+            <a:r>
+              <a:rPr lang="en-US" sz="2400" dirty="0" smtClean="0">
                 <a:solidFill>
                   <a:schemeClr val="tx1"/>
                 </a:solidFill>
@@ -3769,7 +3812,7 @@
               <a:buChar char="q"/>
             </a:pPr>
             <a:r>
-              <a:rPr lang="en-US" sz="2800" dirty="0" smtClean="0">
+              <a:rPr lang="en-US" sz="2400" dirty="0" smtClean="0">
                 <a:solidFill>
                   <a:schemeClr val="tx1"/>
                 </a:solidFill>
@@ -3777,7 +3820,7 @@
               <a:t>Manager – Using </a:t>
             </a:r>
             <a:r>
-              <a:rPr lang="en-US" sz="2800" i="1" dirty="0" smtClean="0">
+              <a:rPr lang="en-US" sz="2400" i="1" dirty="0" smtClean="0">
                 <a:solidFill>
                   <a:schemeClr val="tx1"/>
                 </a:solidFill>
@@ -3785,7 +3828,7 @@
               <a:t>DockerClient</a:t>
             </a:r>
             <a:r>
-              <a:rPr lang="en-US" sz="2800" dirty="0" smtClean="0">
+              <a:rPr lang="en-US" sz="2400" dirty="0" smtClean="0">
                 <a:solidFill>
                   <a:schemeClr val="tx1"/>
                 </a:solidFill>
@@ -3799,7 +3842,7 @@
               <a:buChar char="q"/>
             </a:pPr>
             <a:r>
-              <a:rPr lang="en-US" sz="2800" dirty="0" smtClean="0">
+              <a:rPr lang="en-US" sz="2400" dirty="0" smtClean="0">
                 <a:solidFill>
                   <a:schemeClr val="tx1"/>
                 </a:solidFill>
@@ -3813,13 +3856,32 @@
               <a:buChar char="q"/>
             </a:pPr>
             <a:r>
-              <a:rPr lang="en-US" sz="2800" dirty="0" smtClean="0">
+              <a:rPr lang="en-US" sz="2400" dirty="0" smtClean="0">
                 <a:solidFill>
                   <a:schemeClr val="tx1"/>
                 </a:solidFill>
               </a:rPr>
-              <a:t>Web – A portal to manage micro-services</a:t>
-            </a:r>
+              <a:t>Web – A portal to manage </a:t>
+            </a:r>
+            <a:r>
+              <a:rPr lang="en-US" sz="2400" dirty="0" smtClean="0">
+                <a:solidFill>
+                  <a:schemeClr val="tx1"/>
+                </a:solidFill>
+              </a:rPr>
+              <a:t>micro-services</a:t>
+            </a:r>
+          </a:p>
+          <a:p>
+            <a:pPr marL="800100" lvl="1" indent="-342900">
+              <a:buFont typeface="Wingdings" pitchFamily="2" charset="2"/>
+              <a:buChar char="q"/>
+            </a:pPr>
+            <a:endParaRPr lang="en-US" sz="2400" dirty="0" smtClean="0">
+              <a:solidFill>
+                <a:schemeClr val="tx1"/>
+              </a:solidFill>
+            </a:endParaRPr>
           </a:p>
           <a:p>
             <a:pPr marL="342900" indent="-342900">
@@ -3827,7 +3889,7 @@
               <a:buChar char="q"/>
             </a:pPr>
             <a:r>
-              <a:rPr lang="en-US" sz="2800" dirty="0" smtClean="0">
+              <a:rPr lang="en-US" sz="2400" dirty="0" smtClean="0">
                 <a:solidFill>
                   <a:schemeClr val="tx1"/>
                 </a:solidFill>
@@ -3841,7 +3903,7 @@
               <a:buChar char="q"/>
             </a:pPr>
             <a:r>
-              <a:rPr lang="en-US" sz="2800" dirty="0" smtClean="0">
+              <a:rPr lang="en-US" sz="2400" dirty="0" smtClean="0">
                 <a:solidFill>
                   <a:schemeClr val="tx1"/>
                 </a:solidFill>
@@ -3855,7 +3917,7 @@
               <a:buChar char="q"/>
             </a:pPr>
             <a:r>
-              <a:rPr lang="en-US" sz="2800" dirty="0" smtClean="0">
+              <a:rPr lang="en-US" sz="2400" dirty="0" smtClean="0">
                 <a:solidFill>
                   <a:schemeClr val="tx1"/>
                 </a:solidFill>
@@ -3869,20 +3931,12 @@
               <a:buChar char="q"/>
             </a:pPr>
             <a:r>
-              <a:rPr lang="en-US" sz="2800" dirty="0" smtClean="0">
+              <a:rPr lang="en-US" sz="2400" dirty="0" smtClean="0">
                 <a:solidFill>
                   <a:schemeClr val="tx1"/>
                 </a:solidFill>
               </a:rPr>
-              <a:t>Stop a </a:t>
-            </a:r>
-            <a:r>
-              <a:rPr lang="en-US" sz="2800" dirty="0" smtClean="0">
-                <a:solidFill>
-                  <a:schemeClr val="tx1"/>
-                </a:solidFill>
-              </a:rPr>
-              <a:t>container</a:t>
+              <a:t>Stop a container</a:t>
             </a:r>
           </a:p>
           <a:p>
@@ -3891,7 +3945,7 @@
               <a:buChar char="q"/>
             </a:pPr>
             <a:r>
-              <a:rPr lang="en-US" sz="2800" dirty="0" smtClean="0">
+              <a:rPr lang="en-US" sz="2400" dirty="0" smtClean="0">
                 <a:solidFill>
                   <a:schemeClr val="tx1"/>
                 </a:solidFill>
@@ -3995,7 +4049,7 @@
       </p:sp>
       <p:pic>
         <p:nvPicPr>
-          <p:cNvPr id="1027" name="Picture 3"/>
+          <p:cNvPr id="1028" name="Picture 4"/>
           <p:cNvPicPr>
             <a:picLocks noChangeAspect="1" noChangeArrowheads="1"/>
           </p:cNvPicPr>
@@ -4010,8 +4064,8 @@
         </p:blipFill>
         <p:spPr bwMode="auto">
           <a:xfrm>
-            <a:off x="533400" y="3571401"/>
-            <a:ext cx="6858000" cy="2600799"/>
+            <a:off x="152399" y="762000"/>
+            <a:ext cx="8839201" cy="2895600"/>
           </a:xfrm>
           <a:prstGeom prst="rect">
             <a:avLst/>
@@ -4027,7 +4081,7 @@
       </p:pic>
       <p:pic>
         <p:nvPicPr>
-          <p:cNvPr id="1028" name="Picture 4"/>
+          <p:cNvPr id="1027" name="Picture 3"/>
           <p:cNvPicPr>
             <a:picLocks noChangeAspect="1" noChangeArrowheads="1"/>
           </p:cNvPicPr>
@@ -4042,8 +4096,8 @@
         </p:blipFill>
         <p:spPr bwMode="auto">
           <a:xfrm>
-            <a:off x="152399" y="762000"/>
-            <a:ext cx="8839201" cy="2590800"/>
+            <a:off x="609599" y="3124200"/>
+            <a:ext cx="8238147" cy="3124200"/>
           </a:xfrm>
           <a:prstGeom prst="rect">
             <a:avLst/>

</xml_diff>